<commit_message>
add extension task to 08
</commit_message>
<xml_diff>
--- a/powerpoints/08-building-basic-pages.pptx
+++ b/powerpoints/08-building-basic-pages.pptx
@@ -18261,6 +18261,15 @@
             <a:r>
               <a:rPr/>
               <a:t>Also, save your story in the folder with .html as the extension, instead of .txt– this will be your web version. The .html tells the browser to look for html code in the file. Give it a title with no spaces or punctuation other than dashes or underscores, like “about-zm.html”</a:t>
+            </a:r>
+          </a:p>
+          <a:p>
+            <a:pPr lvl="0" marL="0" indent="0">
+              <a:buNone/>
+            </a:pPr>
+            <a:r>
+              <a:rPr/>
+              <a:t>Fast track : If you know html, mark up your story (in semantic html5) and then use the best css3 tricks you know to make it pretty</a:t>
             </a:r>
           </a:p>
         </p:txBody>

</xml_diff>